<commit_message>
add gifs for all papers
</commit_message>
<xml_diff>
--- a/assets/img/publication_preview/arranger.pptx
+++ b/assets/img/publication_preview/arranger.pptx
@@ -6,6 +6,7 @@
   </p:sldMasterIdLst>
   <p:sldIdLst>
     <p:sldId id="256" r:id="rId2"/>
+    <p:sldId id="257" r:id="rId3"/>
   </p:sldIdLst>
   <p:sldSz cx="12192000" cy="6858000"/>
   <p:notesSz cx="6858000" cy="9144000"/>
@@ -104,13 +105,18 @@
       </a:defRPr>
     </a:lvl9pPr>
   </p:defaultTextStyle>
+  <p:extLst>
+    <p:ext uri="{EFAFB233-063F-42B5-8137-9DF3F51BA10A}">
+      <p15:sldGuideLst xmlns:p15="http://schemas.microsoft.com/office/powerpoint/2012/main"/>
+    </p:ext>
+  </p:extLst>
 </p:presentation>
 </file>
 
 <file path=ppt/revisionInfo.xml><?xml version="1.0" encoding="utf-8"?>
 <p1510:revInfo xmlns:a="http://schemas.openxmlformats.org/drawingml/2006/main" xmlns:r="http://schemas.openxmlformats.org/officeDocument/2006/relationships" xmlns:p1510="http://schemas.microsoft.com/office/powerpoint/2015/10/main">
   <p1510:revLst>
-    <p1510:client id="{0AC6B5A5-B1AB-426F-93E0-9299D74EC545}" v="3" dt="2025-09-06T10:04:37.484"/>
+    <p1510:client id="{35149C54-36B7-44AE-A2D7-E8899F383508}" v="4" dt="2025-12-22T05:42:05.287"/>
   </p1510:revLst>
 </p1510:revInfo>
 </file>
@@ -118,56 +124,119 @@
 <file path=ppt/changesInfos/changesInfo1.xml><?xml version="1.0" encoding="utf-8"?>
 <pc:chgInfo xmlns:a="http://schemas.openxmlformats.org/drawingml/2006/main" xmlns:r="http://schemas.openxmlformats.org/officeDocument/2006/relationships" xmlns:ac="http://schemas.microsoft.com/office/drawing/2013/main/command" xmlns:pc="http://schemas.microsoft.com/office/powerpoint/2013/main/command">
   <pc:docChgLst>
-    <pc:chgData name="Michael Pan" userId="0ee21308d1ee2822" providerId="LiveId" clId="{0AC6B5A5-B1AB-426F-93E0-9299D74EC545}"/>
+    <pc:chgData name="Michael Pan" userId="0ee21308d1ee2822" providerId="LiveId" clId="{CBBBF0EC-AC55-4EB9-9C58-3206341084E5}"/>
     <pc:docChg chg="undo custSel addSld modSld">
-      <pc:chgData name="Michael Pan" userId="0ee21308d1ee2822" providerId="LiveId" clId="{0AC6B5A5-B1AB-426F-93E0-9299D74EC545}" dt="2025-09-06T10:04:41.381" v="26" actId="1076"/>
+      <pc:chgData name="Michael Pan" userId="0ee21308d1ee2822" providerId="LiveId" clId="{CBBBF0EC-AC55-4EB9-9C58-3206341084E5}" dt="2025-12-22T05:42:07.220" v="50" actId="1076"/>
       <pc:docMkLst>
         <pc:docMk/>
       </pc:docMkLst>
-      <pc:sldChg chg="addSp delSp modSp new mod">
-        <pc:chgData name="Michael Pan" userId="0ee21308d1ee2822" providerId="LiveId" clId="{0AC6B5A5-B1AB-426F-93E0-9299D74EC545}" dt="2025-09-06T10:04:41.381" v="26" actId="1076"/>
+      <pc:sldChg chg="addSp delSp modSp mod">
+        <pc:chgData name="Michael Pan" userId="0ee21308d1ee2822" providerId="LiveId" clId="{CBBBF0EC-AC55-4EB9-9C58-3206341084E5}" dt="2025-12-22T05:41:45.975" v="43" actId="478"/>
         <pc:sldMkLst>
           <pc:docMk/>
           <pc:sldMk cId="3805247489" sldId="256"/>
         </pc:sldMkLst>
-        <pc:spChg chg="del">
-          <ac:chgData name="Michael Pan" userId="0ee21308d1ee2822" providerId="LiveId" clId="{0AC6B5A5-B1AB-426F-93E0-9299D74EC545}" dt="2025-09-06T10:03:15.068" v="1" actId="478"/>
-          <ac:spMkLst>
-            <pc:docMk/>
-            <pc:sldMk cId="3805247489" sldId="256"/>
-            <ac:spMk id="2" creationId="{289CB9D3-A16C-D40D-D10C-8F41950F20FD}"/>
-          </ac:spMkLst>
-        </pc:spChg>
-        <pc:spChg chg="del">
-          <ac:chgData name="Michael Pan" userId="0ee21308d1ee2822" providerId="LiveId" clId="{0AC6B5A5-B1AB-426F-93E0-9299D74EC545}" dt="2025-09-06T10:03:15.068" v="1" actId="478"/>
-          <ac:spMkLst>
-            <pc:docMk/>
-            <pc:sldMk cId="3805247489" sldId="256"/>
-            <ac:spMk id="3" creationId="{4C8620AA-087E-03DC-2F99-79D77FACA932}"/>
-          </ac:spMkLst>
-        </pc:spChg>
-        <pc:grpChg chg="add mod">
-          <ac:chgData name="Michael Pan" userId="0ee21308d1ee2822" providerId="LiveId" clId="{0AC6B5A5-B1AB-426F-93E0-9299D74EC545}" dt="2025-09-06T10:04:41.381" v="26" actId="1076"/>
+        <pc:grpChg chg="del">
+          <ac:chgData name="Michael Pan" userId="0ee21308d1ee2822" providerId="LiveId" clId="{CBBBF0EC-AC55-4EB9-9C58-3206341084E5}" dt="2025-12-22T05:41:11.561" v="24" actId="165"/>
           <ac:grpSpMkLst>
             <pc:docMk/>
             <pc:sldMk cId="3805247489" sldId="256"/>
             <ac:grpSpMk id="7" creationId="{66F1C54C-61B2-4EBB-2074-56DE3E65F687}"/>
           </ac:grpSpMkLst>
         </pc:grpChg>
-        <pc:picChg chg="add mod modCrop">
-          <ac:chgData name="Michael Pan" userId="0ee21308d1ee2822" providerId="LiveId" clId="{0AC6B5A5-B1AB-426F-93E0-9299D74EC545}" dt="2025-09-06T10:04:37.484" v="25" actId="164"/>
+        <pc:picChg chg="add del mod">
+          <ac:chgData name="Michael Pan" userId="0ee21308d1ee2822" providerId="LiveId" clId="{CBBBF0EC-AC55-4EB9-9C58-3206341084E5}" dt="2025-12-22T05:41:45.975" v="43" actId="478"/>
+          <ac:picMkLst>
+            <pc:docMk/>
+            <pc:sldMk cId="3805247489" sldId="256"/>
+            <ac:picMk id="2" creationId="{4A29F648-A3D4-7C39-ED12-A1E0592480B7}"/>
+          </ac:picMkLst>
+        </pc:picChg>
+        <pc:picChg chg="mod topLvl">
+          <ac:chgData name="Michael Pan" userId="0ee21308d1ee2822" providerId="LiveId" clId="{CBBBF0EC-AC55-4EB9-9C58-3206341084E5}" dt="2025-12-22T05:41:20.849" v="28" actId="1076"/>
           <ac:picMkLst>
             <pc:docMk/>
             <pc:sldMk cId="3805247489" sldId="256"/>
             <ac:picMk id="5" creationId="{4E31E2B9-2BDB-CB70-4DC7-5BEE8400F331}"/>
           </ac:picMkLst>
         </pc:picChg>
-        <pc:picChg chg="add mod modCrop">
-          <ac:chgData name="Michael Pan" userId="0ee21308d1ee2822" providerId="LiveId" clId="{0AC6B5A5-B1AB-426F-93E0-9299D74EC545}" dt="2025-09-06T10:04:37.484" v="25" actId="164"/>
+        <pc:picChg chg="mod topLvl">
+          <ac:chgData name="Michael Pan" userId="0ee21308d1ee2822" providerId="LiveId" clId="{CBBBF0EC-AC55-4EB9-9C58-3206341084E5}" dt="2025-12-22T05:41:20.612" v="27" actId="1076"/>
           <ac:picMkLst>
             <pc:docMk/>
             <pc:sldMk cId="3805247489" sldId="256"/>
             <ac:picMk id="6" creationId="{13584306-5B7A-4D00-70D6-7A504B6CFA0A}"/>
+          </ac:picMkLst>
+        </pc:picChg>
+      </pc:sldChg>
+      <pc:sldChg chg="addSp delSp modSp new mod">
+        <pc:chgData name="Michael Pan" userId="0ee21308d1ee2822" providerId="LiveId" clId="{CBBBF0EC-AC55-4EB9-9C58-3206341084E5}" dt="2025-12-22T05:42:07.220" v="50" actId="1076"/>
+        <pc:sldMkLst>
+          <pc:docMk/>
+          <pc:sldMk cId="155932506" sldId="257"/>
+        </pc:sldMkLst>
+        <pc:spChg chg="del">
+          <ac:chgData name="Michael Pan" userId="0ee21308d1ee2822" providerId="LiveId" clId="{CBBBF0EC-AC55-4EB9-9C58-3206341084E5}" dt="2025-12-22T05:39:39.693" v="1" actId="478"/>
+          <ac:spMkLst>
+            <pc:docMk/>
+            <pc:sldMk cId="155932506" sldId="257"/>
+            <ac:spMk id="2" creationId="{55DE54C8-9A9F-A604-9B8E-E70FC6463484}"/>
+          </ac:spMkLst>
+        </pc:spChg>
+        <pc:spChg chg="del">
+          <ac:chgData name="Michael Pan" userId="0ee21308d1ee2822" providerId="LiveId" clId="{CBBBF0EC-AC55-4EB9-9C58-3206341084E5}" dt="2025-12-22T05:39:39.693" v="1" actId="478"/>
+          <ac:spMkLst>
+            <pc:docMk/>
+            <pc:sldMk cId="155932506" sldId="257"/>
+            <ac:spMk id="3" creationId="{59FA7A7A-E87E-B722-B694-5D8DAE4A8DD0}"/>
+          </ac:spMkLst>
+        </pc:spChg>
+        <pc:grpChg chg="add mod">
+          <ac:chgData name="Michael Pan" userId="0ee21308d1ee2822" providerId="LiveId" clId="{CBBBF0EC-AC55-4EB9-9C58-3206341084E5}" dt="2025-12-22T05:42:07.220" v="50" actId="1076"/>
+          <ac:grpSpMkLst>
+            <pc:docMk/>
+            <pc:sldMk cId="155932506" sldId="257"/>
+            <ac:grpSpMk id="13" creationId="{78B8AAB7-C583-4D6E-A8C6-C2FD06770E74}"/>
+          </ac:grpSpMkLst>
+        </pc:grpChg>
+        <pc:picChg chg="add del mod">
+          <ac:chgData name="Michael Pan" userId="0ee21308d1ee2822" providerId="LiveId" clId="{CBBBF0EC-AC55-4EB9-9C58-3206341084E5}" dt="2025-12-22T05:39:47.149" v="5" actId="478"/>
+          <ac:picMkLst>
+            <pc:docMk/>
+            <pc:sldMk cId="155932506" sldId="257"/>
+            <ac:picMk id="5" creationId="{29A57C29-C656-AC3F-7736-E79BDFD8E171}"/>
+          </ac:picMkLst>
+        </pc:picChg>
+        <pc:picChg chg="add del mod">
+          <ac:chgData name="Michael Pan" userId="0ee21308d1ee2822" providerId="LiveId" clId="{CBBBF0EC-AC55-4EB9-9C58-3206341084E5}" dt="2025-12-22T05:41:32.541" v="35" actId="478"/>
+          <ac:picMkLst>
+            <pc:docMk/>
+            <pc:sldMk cId="155932506" sldId="257"/>
+            <ac:picMk id="7" creationId="{9634F406-7583-76FE-E6EF-D56BA77282D3}"/>
+          </ac:picMkLst>
+        </pc:picChg>
+        <pc:picChg chg="add mod">
+          <ac:chgData name="Michael Pan" userId="0ee21308d1ee2822" providerId="LiveId" clId="{CBBBF0EC-AC55-4EB9-9C58-3206341084E5}" dt="2025-12-22T05:42:05.287" v="49" actId="164"/>
+          <ac:picMkLst>
+            <pc:docMk/>
+            <pc:sldMk cId="155932506" sldId="257"/>
+            <ac:picMk id="9" creationId="{2F8D9E0B-747B-43D7-76E5-8C3E751F8F92}"/>
+          </ac:picMkLst>
+        </pc:picChg>
+        <pc:picChg chg="add mod">
+          <ac:chgData name="Michael Pan" userId="0ee21308d1ee2822" providerId="LiveId" clId="{CBBBF0EC-AC55-4EB9-9C58-3206341084E5}" dt="2025-12-22T05:42:05.287" v="49" actId="164"/>
+          <ac:picMkLst>
+            <pc:docMk/>
+            <pc:sldMk cId="155932506" sldId="257"/>
+            <ac:picMk id="11" creationId="{B10D88E1-8942-167E-256B-E4DE62A253F3}"/>
+          </ac:picMkLst>
+        </pc:picChg>
+        <pc:picChg chg="add mod">
+          <ac:chgData name="Michael Pan" userId="0ee21308d1ee2822" providerId="LiveId" clId="{CBBBF0EC-AC55-4EB9-9C58-3206341084E5}" dt="2025-12-22T05:42:05.287" v="49" actId="164"/>
+          <ac:picMkLst>
+            <pc:docMk/>
+            <pc:sldMk cId="155932506" sldId="257"/>
+            <ac:picMk id="12" creationId="{9FD07A5D-5130-70FE-5E09-7594D67D5681}"/>
           </ac:picMkLst>
         </pc:picChg>
       </pc:sldChg>
@@ -325,7 +394,7 @@
           <a:p>
             <a:fld id="{77B50B24-96A8-4A74-AAAC-CE8A8F80A192}" type="datetimeFigureOut">
               <a:rPr lang="en-AU" smtClean="0"/>
-              <a:t>6/09/2025</a:t>
+              <a:t>21/12/2025</a:t>
             </a:fld>
             <a:endParaRPr lang="en-AU"/>
           </a:p>
@@ -525,7 +594,7 @@
           <a:p>
             <a:fld id="{77B50B24-96A8-4A74-AAAC-CE8A8F80A192}" type="datetimeFigureOut">
               <a:rPr lang="en-AU" smtClean="0"/>
-              <a:t>6/09/2025</a:t>
+              <a:t>21/12/2025</a:t>
             </a:fld>
             <a:endParaRPr lang="en-AU"/>
           </a:p>
@@ -735,7 +804,7 @@
           <a:p>
             <a:fld id="{77B50B24-96A8-4A74-AAAC-CE8A8F80A192}" type="datetimeFigureOut">
               <a:rPr lang="en-AU" smtClean="0"/>
-              <a:t>6/09/2025</a:t>
+              <a:t>21/12/2025</a:t>
             </a:fld>
             <a:endParaRPr lang="en-AU"/>
           </a:p>
@@ -935,7 +1004,7 @@
           <a:p>
             <a:fld id="{77B50B24-96A8-4A74-AAAC-CE8A8F80A192}" type="datetimeFigureOut">
               <a:rPr lang="en-AU" smtClean="0"/>
-              <a:t>6/09/2025</a:t>
+              <a:t>21/12/2025</a:t>
             </a:fld>
             <a:endParaRPr lang="en-AU"/>
           </a:p>
@@ -1211,7 +1280,7 @@
           <a:p>
             <a:fld id="{77B50B24-96A8-4A74-AAAC-CE8A8F80A192}" type="datetimeFigureOut">
               <a:rPr lang="en-AU" smtClean="0"/>
-              <a:t>6/09/2025</a:t>
+              <a:t>21/12/2025</a:t>
             </a:fld>
             <a:endParaRPr lang="en-AU"/>
           </a:p>
@@ -1479,7 +1548,7 @@
           <a:p>
             <a:fld id="{77B50B24-96A8-4A74-AAAC-CE8A8F80A192}" type="datetimeFigureOut">
               <a:rPr lang="en-AU" smtClean="0"/>
-              <a:t>6/09/2025</a:t>
+              <a:t>21/12/2025</a:t>
             </a:fld>
             <a:endParaRPr lang="en-AU"/>
           </a:p>
@@ -1894,7 +1963,7 @@
           <a:p>
             <a:fld id="{77B50B24-96A8-4A74-AAAC-CE8A8F80A192}" type="datetimeFigureOut">
               <a:rPr lang="en-AU" smtClean="0"/>
-              <a:t>6/09/2025</a:t>
+              <a:t>21/12/2025</a:t>
             </a:fld>
             <a:endParaRPr lang="en-AU"/>
           </a:p>
@@ -2036,7 +2105,7 @@
           <a:p>
             <a:fld id="{77B50B24-96A8-4A74-AAAC-CE8A8F80A192}" type="datetimeFigureOut">
               <a:rPr lang="en-AU" smtClean="0"/>
-              <a:t>6/09/2025</a:t>
+              <a:t>21/12/2025</a:t>
             </a:fld>
             <a:endParaRPr lang="en-AU"/>
           </a:p>
@@ -2149,7 +2218,7 @@
           <a:p>
             <a:fld id="{77B50B24-96A8-4A74-AAAC-CE8A8F80A192}" type="datetimeFigureOut">
               <a:rPr lang="en-AU" smtClean="0"/>
-              <a:t>6/09/2025</a:t>
+              <a:t>21/12/2025</a:t>
             </a:fld>
             <a:endParaRPr lang="en-AU"/>
           </a:p>
@@ -2462,7 +2531,7 @@
           <a:p>
             <a:fld id="{77B50B24-96A8-4A74-AAAC-CE8A8F80A192}" type="datetimeFigureOut">
               <a:rPr lang="en-AU" smtClean="0"/>
-              <a:t>6/09/2025</a:t>
+              <a:t>21/12/2025</a:t>
             </a:fld>
             <a:endParaRPr lang="en-AU"/>
           </a:p>
@@ -2751,7 +2820,7 @@
           <a:p>
             <a:fld id="{77B50B24-96A8-4A74-AAAC-CE8A8F80A192}" type="datetimeFigureOut">
               <a:rPr lang="en-AU" smtClean="0"/>
-              <a:t>6/09/2025</a:t>
+              <a:t>21/12/2025</a:t>
             </a:fld>
             <a:endParaRPr lang="en-AU"/>
           </a:p>
@@ -2994,7 +3063,7 @@
           <a:p>
             <a:fld id="{77B50B24-96A8-4A74-AAAC-CE8A8F80A192}" type="datetimeFigureOut">
               <a:rPr lang="en-AU" smtClean="0"/>
-              <a:t>6/09/2025</a:t>
+              <a:t>21/12/2025</a:t>
             </a:fld>
             <a:endParaRPr lang="en-AU"/>
           </a:p>
@@ -3411,12 +3480,116 @@
           <a:chExt cx="0" cy="0"/>
         </a:xfrm>
       </p:grpSpPr>
+      <p:pic>
+        <p:nvPicPr>
+          <p:cNvPr id="5" name="Picture 4" descr="A couple of heads of people with different facial features&#10;&#10;AI-generated content may be incorrect.">
+            <a:extLst>
+              <a:ext uri="{FF2B5EF4-FFF2-40B4-BE49-F238E27FC236}">
+                <a16:creationId xmlns:a16="http://schemas.microsoft.com/office/drawing/2014/main" id="{4E31E2B9-2BDB-CB70-4DC7-5BEE8400F331}"/>
+              </a:ext>
+            </a:extLst>
+          </p:cNvPr>
+          <p:cNvPicPr>
+            <a:picLocks noChangeAspect="1"/>
+          </p:cNvPicPr>
+          <p:nvPr/>
+        </p:nvPicPr>
+        <p:blipFill>
+          <a:blip r:embed="rId2">
+            <a:extLst>
+              <a:ext uri="{28A0092B-C50C-407E-A947-70E740481C1C}">
+                <a14:useLocalDpi xmlns:a14="http://schemas.microsoft.com/office/drawing/2010/main" val="0"/>
+              </a:ext>
+            </a:extLst>
+          </a:blip>
+          <a:srcRect t="14363" r="50566" b="10632"/>
+          <a:stretch>
+            <a:fillRect/>
+          </a:stretch>
+        </p:blipFill>
+        <p:spPr>
+          <a:xfrm>
+            <a:off x="3399295" y="1212350"/>
+            <a:ext cx="5393409" cy="2219218"/>
+          </a:xfrm>
+          <a:prstGeom prst="rect">
+            <a:avLst/>
+          </a:prstGeom>
+        </p:spPr>
+      </p:pic>
+      <p:pic>
+        <p:nvPicPr>
+          <p:cNvPr id="6" name="Picture 5" descr="A couple of heads of people with different facial features&#10;&#10;AI-generated content may be incorrect.">
+            <a:extLst>
+              <a:ext uri="{FF2B5EF4-FFF2-40B4-BE49-F238E27FC236}">
+                <a16:creationId xmlns:a16="http://schemas.microsoft.com/office/drawing/2014/main" id="{13584306-5B7A-4D00-70D6-7A504B6CFA0A}"/>
+              </a:ext>
+            </a:extLst>
+          </p:cNvPr>
+          <p:cNvPicPr>
+            <a:picLocks noChangeAspect="1"/>
+          </p:cNvPicPr>
+          <p:nvPr/>
+        </p:nvPicPr>
+        <p:blipFill>
+          <a:blip r:embed="rId2">
+            <a:extLst>
+              <a:ext uri="{28A0092B-C50C-407E-A947-70E740481C1C}">
+                <a14:useLocalDpi xmlns:a14="http://schemas.microsoft.com/office/drawing/2010/main" val="0"/>
+              </a:ext>
+            </a:extLst>
+          </a:blip>
+          <a:srcRect l="55368" t="15718" b="9915"/>
+          <a:stretch>
+            <a:fillRect/>
+          </a:stretch>
+        </p:blipFill>
+        <p:spPr>
+          <a:xfrm>
+            <a:off x="3661250" y="3426431"/>
+            <a:ext cx="4869497" cy="2219219"/>
+          </a:xfrm>
+          <a:prstGeom prst="rect">
+            <a:avLst/>
+          </a:prstGeom>
+        </p:spPr>
+      </p:pic>
+    </p:spTree>
+    <p:extLst>
+      <p:ext uri="{BB962C8B-B14F-4D97-AF65-F5344CB8AC3E}">
+        <p14:creationId xmlns:p14="http://schemas.microsoft.com/office/powerpoint/2010/main" val="3805247489"/>
+      </p:ext>
+    </p:extLst>
+  </p:cSld>
+  <p:clrMapOvr>
+    <a:masterClrMapping/>
+  </p:clrMapOvr>
+</p:sld>
+</file>
+
+<file path=ppt/slides/slide2.xml><?xml version="1.0" encoding="utf-8"?>
+<p:sld xmlns:a="http://schemas.openxmlformats.org/drawingml/2006/main" xmlns:r="http://schemas.openxmlformats.org/officeDocument/2006/relationships" xmlns:p="http://schemas.openxmlformats.org/presentationml/2006/main">
+  <p:cSld>
+    <p:spTree>
+      <p:nvGrpSpPr>
+        <p:cNvPr id="1" name=""/>
+        <p:cNvGrpSpPr/>
+        <p:nvPr/>
+      </p:nvGrpSpPr>
+      <p:grpSpPr>
+        <a:xfrm>
+          <a:off x="0" y="0"/>
+          <a:ext cx="0" cy="0"/>
+          <a:chOff x="0" y="0"/>
+          <a:chExt cx="0" cy="0"/>
+        </a:xfrm>
+      </p:grpSpPr>
       <p:grpSp>
         <p:nvGrpSpPr>
-          <p:cNvPr id="7" name="Group 6">
-            <a:extLst>
-              <a:ext uri="{FF2B5EF4-FFF2-40B4-BE49-F238E27FC236}">
-                <a16:creationId xmlns:a16="http://schemas.microsoft.com/office/drawing/2014/main" id="{66F1C54C-61B2-4EBB-2074-56DE3E65F687}"/>
+          <p:cNvPr id="13" name="Group 12">
+            <a:extLst>
+              <a:ext uri="{FF2B5EF4-FFF2-40B4-BE49-F238E27FC236}">
+                <a16:creationId xmlns:a16="http://schemas.microsoft.com/office/drawing/2014/main" id="{78B8AAB7-C583-4D6E-A8C6-C2FD06770E74}"/>
               </a:ext>
             </a:extLst>
           </p:cNvPr>
@@ -3425,18 +3598,18 @@
         </p:nvGrpSpPr>
         <p:grpSpPr>
           <a:xfrm>
-            <a:off x="3399295" y="1212350"/>
-            <a:ext cx="5393409" cy="4433300"/>
-            <a:chOff x="514231" y="657546"/>
-            <a:chExt cx="5393409" cy="4433300"/>
+            <a:off x="3235778" y="2368607"/>
+            <a:ext cx="5720444" cy="2120786"/>
+            <a:chOff x="3367346" y="2156247"/>
+            <a:chExt cx="5720444" cy="2120786"/>
           </a:xfrm>
         </p:grpSpPr>
         <p:pic>
           <p:nvPicPr>
-            <p:cNvPr id="5" name="Picture 4" descr="A couple of heads of people with different facial features&#10;&#10;AI-generated content may be incorrect.">
+            <p:cNvPr id="9" name="Picture 8" descr="A person wearing a mask&#10;&#10;AI-generated content may be incorrect.">
               <a:extLst>
                 <a:ext uri="{FF2B5EF4-FFF2-40B4-BE49-F238E27FC236}">
-                  <a16:creationId xmlns:a16="http://schemas.microsoft.com/office/drawing/2014/main" id="{4E31E2B9-2BDB-CB70-4DC7-5BEE8400F331}"/>
+                  <a16:creationId xmlns:a16="http://schemas.microsoft.com/office/drawing/2014/main" id="{2F8D9E0B-747B-43D7-76E5-8C3E751F8F92}"/>
                 </a:ext>
               </a:extLst>
             </p:cNvPr>
@@ -3446,22 +3619,15 @@
             <p:nvPr/>
           </p:nvPicPr>
           <p:blipFill>
-            <a:blip r:embed="rId2">
-              <a:extLst>
-                <a:ext uri="{28A0092B-C50C-407E-A947-70E740481C1C}">
-                  <a14:useLocalDpi xmlns:a14="http://schemas.microsoft.com/office/drawing/2010/main" val="0"/>
-                </a:ext>
-              </a:extLst>
-            </a:blip>
-            <a:srcRect t="14363" r="50566" b="10632"/>
+            <a:blip r:embed="rId2"/>
             <a:stretch>
               <a:fillRect/>
             </a:stretch>
           </p:blipFill>
           <p:spPr>
             <a:xfrm>
-              <a:off x="514231" y="657546"/>
-              <a:ext cx="5393409" cy="2219218"/>
+              <a:off x="5288007" y="2156247"/>
+              <a:ext cx="1759801" cy="2120786"/>
             </a:xfrm>
             <a:prstGeom prst="rect">
               <a:avLst/>
@@ -3470,10 +3636,10 @@
         </p:pic>
         <p:pic>
           <p:nvPicPr>
-            <p:cNvPr id="6" name="Picture 5" descr="A couple of heads of people with different facial features&#10;&#10;AI-generated content may be incorrect.">
+            <p:cNvPr id="11" name="Picture 10" descr="A white robot with flowers on it&#10;&#10;AI-generated content may be incorrect.">
               <a:extLst>
                 <a:ext uri="{FF2B5EF4-FFF2-40B4-BE49-F238E27FC236}">
-                  <a16:creationId xmlns:a16="http://schemas.microsoft.com/office/drawing/2014/main" id="{13584306-5B7A-4D00-70D6-7A504B6CFA0A}"/>
+                  <a16:creationId xmlns:a16="http://schemas.microsoft.com/office/drawing/2014/main" id="{B10D88E1-8942-167E-256B-E4DE62A253F3}"/>
                 </a:ext>
               </a:extLst>
             </p:cNvPr>
@@ -3483,22 +3649,45 @@
             <p:nvPr/>
           </p:nvPicPr>
           <p:blipFill>
-            <a:blip r:embed="rId2">
-              <a:extLst>
-                <a:ext uri="{28A0092B-C50C-407E-A947-70E740481C1C}">
-                  <a14:useLocalDpi xmlns:a14="http://schemas.microsoft.com/office/drawing/2010/main" val="0"/>
-                </a:ext>
-              </a:extLst>
-            </a:blip>
-            <a:srcRect l="55368" t="15718" b="9915"/>
+            <a:blip r:embed="rId3"/>
             <a:stretch>
               <a:fillRect/>
             </a:stretch>
           </p:blipFill>
           <p:spPr>
             <a:xfrm>
-              <a:off x="776186" y="2871627"/>
-              <a:ext cx="4869497" cy="2219219"/>
+              <a:off x="7287265" y="2156247"/>
+              <a:ext cx="1800525" cy="2120786"/>
+            </a:xfrm>
+            <a:prstGeom prst="rect">
+              <a:avLst/>
+            </a:prstGeom>
+          </p:spPr>
+        </p:pic>
+        <p:pic>
+          <p:nvPicPr>
+            <p:cNvPr id="12" name="Picture 11" descr="A white robot with a face painted on it&#10;&#10;AI-generated content may be incorrect.">
+              <a:extLst>
+                <a:ext uri="{FF2B5EF4-FFF2-40B4-BE49-F238E27FC236}">
+                  <a16:creationId xmlns:a16="http://schemas.microsoft.com/office/drawing/2014/main" id="{9FD07A5D-5130-70FE-5E09-7594D67D5681}"/>
+                </a:ext>
+              </a:extLst>
+            </p:cNvPr>
+            <p:cNvPicPr>
+              <a:picLocks noChangeAspect="1"/>
+            </p:cNvPicPr>
+            <p:nvPr/>
+          </p:nvPicPr>
+          <p:blipFill>
+            <a:blip r:embed="rId4"/>
+            <a:stretch>
+              <a:fillRect/>
+            </a:stretch>
+          </p:blipFill>
+          <p:spPr>
+            <a:xfrm>
+              <a:off x="3367346" y="2156248"/>
+              <a:ext cx="1681204" cy="2120785"/>
             </a:xfrm>
             <a:prstGeom prst="rect">
               <a:avLst/>
@@ -3509,7 +3698,7 @@
     </p:spTree>
     <p:extLst>
       <p:ext uri="{BB962C8B-B14F-4D97-AF65-F5344CB8AC3E}">
-        <p14:creationId xmlns:p14="http://schemas.microsoft.com/office/powerpoint/2010/main" val="3805247489"/>
+        <p14:creationId xmlns:p14="http://schemas.microsoft.com/office/powerpoint/2010/main" val="155932506"/>
       </p:ext>
     </p:extLst>
   </p:cSld>

</xml_diff>

<commit_message>
Deploying to gh-pages from @ mpan31415/mpan31415.github.io@c92d0a1db2a2b5a2be429da0ac2188bc4b380e9e 🚀
</commit_message>
<xml_diff>
--- a/assets/img/publication_preview/arranger.pptx
+++ b/assets/img/publication_preview/arranger.pptx
@@ -6,6 +6,7 @@
   </p:sldMasterIdLst>
   <p:sldIdLst>
     <p:sldId id="256" r:id="rId2"/>
+    <p:sldId id="257" r:id="rId3"/>
   </p:sldIdLst>
   <p:sldSz cx="12192000" cy="6858000"/>
   <p:notesSz cx="6858000" cy="9144000"/>
@@ -104,13 +105,18 @@
       </a:defRPr>
     </a:lvl9pPr>
   </p:defaultTextStyle>
+  <p:extLst>
+    <p:ext uri="{EFAFB233-063F-42B5-8137-9DF3F51BA10A}">
+      <p15:sldGuideLst xmlns:p15="http://schemas.microsoft.com/office/powerpoint/2012/main"/>
+    </p:ext>
+  </p:extLst>
 </p:presentation>
 </file>
 
 <file path=ppt/revisionInfo.xml><?xml version="1.0" encoding="utf-8"?>
 <p1510:revInfo xmlns:a="http://schemas.openxmlformats.org/drawingml/2006/main" xmlns:r="http://schemas.openxmlformats.org/officeDocument/2006/relationships" xmlns:p1510="http://schemas.microsoft.com/office/powerpoint/2015/10/main">
   <p1510:revLst>
-    <p1510:client id="{0AC6B5A5-B1AB-426F-93E0-9299D74EC545}" v="3" dt="2025-09-06T10:04:37.484"/>
+    <p1510:client id="{35149C54-36B7-44AE-A2D7-E8899F383508}" v="4" dt="2025-12-22T05:42:05.287"/>
   </p1510:revLst>
 </p1510:revInfo>
 </file>
@@ -118,56 +124,119 @@
 <file path=ppt/changesInfos/changesInfo1.xml><?xml version="1.0" encoding="utf-8"?>
 <pc:chgInfo xmlns:a="http://schemas.openxmlformats.org/drawingml/2006/main" xmlns:r="http://schemas.openxmlformats.org/officeDocument/2006/relationships" xmlns:ac="http://schemas.microsoft.com/office/drawing/2013/main/command" xmlns:pc="http://schemas.microsoft.com/office/powerpoint/2013/main/command">
   <pc:docChgLst>
-    <pc:chgData name="Michael Pan" userId="0ee21308d1ee2822" providerId="LiveId" clId="{0AC6B5A5-B1AB-426F-93E0-9299D74EC545}"/>
+    <pc:chgData name="Michael Pan" userId="0ee21308d1ee2822" providerId="LiveId" clId="{CBBBF0EC-AC55-4EB9-9C58-3206341084E5}"/>
     <pc:docChg chg="undo custSel addSld modSld">
-      <pc:chgData name="Michael Pan" userId="0ee21308d1ee2822" providerId="LiveId" clId="{0AC6B5A5-B1AB-426F-93E0-9299D74EC545}" dt="2025-09-06T10:04:41.381" v="26" actId="1076"/>
+      <pc:chgData name="Michael Pan" userId="0ee21308d1ee2822" providerId="LiveId" clId="{CBBBF0EC-AC55-4EB9-9C58-3206341084E5}" dt="2025-12-22T05:42:07.220" v="50" actId="1076"/>
       <pc:docMkLst>
         <pc:docMk/>
       </pc:docMkLst>
-      <pc:sldChg chg="addSp delSp modSp new mod">
-        <pc:chgData name="Michael Pan" userId="0ee21308d1ee2822" providerId="LiveId" clId="{0AC6B5A5-B1AB-426F-93E0-9299D74EC545}" dt="2025-09-06T10:04:41.381" v="26" actId="1076"/>
+      <pc:sldChg chg="addSp delSp modSp mod">
+        <pc:chgData name="Michael Pan" userId="0ee21308d1ee2822" providerId="LiveId" clId="{CBBBF0EC-AC55-4EB9-9C58-3206341084E5}" dt="2025-12-22T05:41:45.975" v="43" actId="478"/>
         <pc:sldMkLst>
           <pc:docMk/>
           <pc:sldMk cId="3805247489" sldId="256"/>
         </pc:sldMkLst>
-        <pc:spChg chg="del">
-          <ac:chgData name="Michael Pan" userId="0ee21308d1ee2822" providerId="LiveId" clId="{0AC6B5A5-B1AB-426F-93E0-9299D74EC545}" dt="2025-09-06T10:03:15.068" v="1" actId="478"/>
-          <ac:spMkLst>
-            <pc:docMk/>
-            <pc:sldMk cId="3805247489" sldId="256"/>
-            <ac:spMk id="2" creationId="{289CB9D3-A16C-D40D-D10C-8F41950F20FD}"/>
-          </ac:spMkLst>
-        </pc:spChg>
-        <pc:spChg chg="del">
-          <ac:chgData name="Michael Pan" userId="0ee21308d1ee2822" providerId="LiveId" clId="{0AC6B5A5-B1AB-426F-93E0-9299D74EC545}" dt="2025-09-06T10:03:15.068" v="1" actId="478"/>
-          <ac:spMkLst>
-            <pc:docMk/>
-            <pc:sldMk cId="3805247489" sldId="256"/>
-            <ac:spMk id="3" creationId="{4C8620AA-087E-03DC-2F99-79D77FACA932}"/>
-          </ac:spMkLst>
-        </pc:spChg>
-        <pc:grpChg chg="add mod">
-          <ac:chgData name="Michael Pan" userId="0ee21308d1ee2822" providerId="LiveId" clId="{0AC6B5A5-B1AB-426F-93E0-9299D74EC545}" dt="2025-09-06T10:04:41.381" v="26" actId="1076"/>
+        <pc:grpChg chg="del">
+          <ac:chgData name="Michael Pan" userId="0ee21308d1ee2822" providerId="LiveId" clId="{CBBBF0EC-AC55-4EB9-9C58-3206341084E5}" dt="2025-12-22T05:41:11.561" v="24" actId="165"/>
           <ac:grpSpMkLst>
             <pc:docMk/>
             <pc:sldMk cId="3805247489" sldId="256"/>
             <ac:grpSpMk id="7" creationId="{66F1C54C-61B2-4EBB-2074-56DE3E65F687}"/>
           </ac:grpSpMkLst>
         </pc:grpChg>
-        <pc:picChg chg="add mod modCrop">
-          <ac:chgData name="Michael Pan" userId="0ee21308d1ee2822" providerId="LiveId" clId="{0AC6B5A5-B1AB-426F-93E0-9299D74EC545}" dt="2025-09-06T10:04:37.484" v="25" actId="164"/>
+        <pc:picChg chg="add del mod">
+          <ac:chgData name="Michael Pan" userId="0ee21308d1ee2822" providerId="LiveId" clId="{CBBBF0EC-AC55-4EB9-9C58-3206341084E5}" dt="2025-12-22T05:41:45.975" v="43" actId="478"/>
+          <ac:picMkLst>
+            <pc:docMk/>
+            <pc:sldMk cId="3805247489" sldId="256"/>
+            <ac:picMk id="2" creationId="{4A29F648-A3D4-7C39-ED12-A1E0592480B7}"/>
+          </ac:picMkLst>
+        </pc:picChg>
+        <pc:picChg chg="mod topLvl">
+          <ac:chgData name="Michael Pan" userId="0ee21308d1ee2822" providerId="LiveId" clId="{CBBBF0EC-AC55-4EB9-9C58-3206341084E5}" dt="2025-12-22T05:41:20.849" v="28" actId="1076"/>
           <ac:picMkLst>
             <pc:docMk/>
             <pc:sldMk cId="3805247489" sldId="256"/>
             <ac:picMk id="5" creationId="{4E31E2B9-2BDB-CB70-4DC7-5BEE8400F331}"/>
           </ac:picMkLst>
         </pc:picChg>
-        <pc:picChg chg="add mod modCrop">
-          <ac:chgData name="Michael Pan" userId="0ee21308d1ee2822" providerId="LiveId" clId="{0AC6B5A5-B1AB-426F-93E0-9299D74EC545}" dt="2025-09-06T10:04:37.484" v="25" actId="164"/>
+        <pc:picChg chg="mod topLvl">
+          <ac:chgData name="Michael Pan" userId="0ee21308d1ee2822" providerId="LiveId" clId="{CBBBF0EC-AC55-4EB9-9C58-3206341084E5}" dt="2025-12-22T05:41:20.612" v="27" actId="1076"/>
           <ac:picMkLst>
             <pc:docMk/>
             <pc:sldMk cId="3805247489" sldId="256"/>
             <ac:picMk id="6" creationId="{13584306-5B7A-4D00-70D6-7A504B6CFA0A}"/>
+          </ac:picMkLst>
+        </pc:picChg>
+      </pc:sldChg>
+      <pc:sldChg chg="addSp delSp modSp new mod">
+        <pc:chgData name="Michael Pan" userId="0ee21308d1ee2822" providerId="LiveId" clId="{CBBBF0EC-AC55-4EB9-9C58-3206341084E5}" dt="2025-12-22T05:42:07.220" v="50" actId="1076"/>
+        <pc:sldMkLst>
+          <pc:docMk/>
+          <pc:sldMk cId="155932506" sldId="257"/>
+        </pc:sldMkLst>
+        <pc:spChg chg="del">
+          <ac:chgData name="Michael Pan" userId="0ee21308d1ee2822" providerId="LiveId" clId="{CBBBF0EC-AC55-4EB9-9C58-3206341084E5}" dt="2025-12-22T05:39:39.693" v="1" actId="478"/>
+          <ac:spMkLst>
+            <pc:docMk/>
+            <pc:sldMk cId="155932506" sldId="257"/>
+            <ac:spMk id="2" creationId="{55DE54C8-9A9F-A604-9B8E-E70FC6463484}"/>
+          </ac:spMkLst>
+        </pc:spChg>
+        <pc:spChg chg="del">
+          <ac:chgData name="Michael Pan" userId="0ee21308d1ee2822" providerId="LiveId" clId="{CBBBF0EC-AC55-4EB9-9C58-3206341084E5}" dt="2025-12-22T05:39:39.693" v="1" actId="478"/>
+          <ac:spMkLst>
+            <pc:docMk/>
+            <pc:sldMk cId="155932506" sldId="257"/>
+            <ac:spMk id="3" creationId="{59FA7A7A-E87E-B722-B694-5D8DAE4A8DD0}"/>
+          </ac:spMkLst>
+        </pc:spChg>
+        <pc:grpChg chg="add mod">
+          <ac:chgData name="Michael Pan" userId="0ee21308d1ee2822" providerId="LiveId" clId="{CBBBF0EC-AC55-4EB9-9C58-3206341084E5}" dt="2025-12-22T05:42:07.220" v="50" actId="1076"/>
+          <ac:grpSpMkLst>
+            <pc:docMk/>
+            <pc:sldMk cId="155932506" sldId="257"/>
+            <ac:grpSpMk id="13" creationId="{78B8AAB7-C583-4D6E-A8C6-C2FD06770E74}"/>
+          </ac:grpSpMkLst>
+        </pc:grpChg>
+        <pc:picChg chg="add del mod">
+          <ac:chgData name="Michael Pan" userId="0ee21308d1ee2822" providerId="LiveId" clId="{CBBBF0EC-AC55-4EB9-9C58-3206341084E5}" dt="2025-12-22T05:39:47.149" v="5" actId="478"/>
+          <ac:picMkLst>
+            <pc:docMk/>
+            <pc:sldMk cId="155932506" sldId="257"/>
+            <ac:picMk id="5" creationId="{29A57C29-C656-AC3F-7736-E79BDFD8E171}"/>
+          </ac:picMkLst>
+        </pc:picChg>
+        <pc:picChg chg="add del mod">
+          <ac:chgData name="Michael Pan" userId="0ee21308d1ee2822" providerId="LiveId" clId="{CBBBF0EC-AC55-4EB9-9C58-3206341084E5}" dt="2025-12-22T05:41:32.541" v="35" actId="478"/>
+          <ac:picMkLst>
+            <pc:docMk/>
+            <pc:sldMk cId="155932506" sldId="257"/>
+            <ac:picMk id="7" creationId="{9634F406-7583-76FE-E6EF-D56BA77282D3}"/>
+          </ac:picMkLst>
+        </pc:picChg>
+        <pc:picChg chg="add mod">
+          <ac:chgData name="Michael Pan" userId="0ee21308d1ee2822" providerId="LiveId" clId="{CBBBF0EC-AC55-4EB9-9C58-3206341084E5}" dt="2025-12-22T05:42:05.287" v="49" actId="164"/>
+          <ac:picMkLst>
+            <pc:docMk/>
+            <pc:sldMk cId="155932506" sldId="257"/>
+            <ac:picMk id="9" creationId="{2F8D9E0B-747B-43D7-76E5-8C3E751F8F92}"/>
+          </ac:picMkLst>
+        </pc:picChg>
+        <pc:picChg chg="add mod">
+          <ac:chgData name="Michael Pan" userId="0ee21308d1ee2822" providerId="LiveId" clId="{CBBBF0EC-AC55-4EB9-9C58-3206341084E5}" dt="2025-12-22T05:42:05.287" v="49" actId="164"/>
+          <ac:picMkLst>
+            <pc:docMk/>
+            <pc:sldMk cId="155932506" sldId="257"/>
+            <ac:picMk id="11" creationId="{B10D88E1-8942-167E-256B-E4DE62A253F3}"/>
+          </ac:picMkLst>
+        </pc:picChg>
+        <pc:picChg chg="add mod">
+          <ac:chgData name="Michael Pan" userId="0ee21308d1ee2822" providerId="LiveId" clId="{CBBBF0EC-AC55-4EB9-9C58-3206341084E5}" dt="2025-12-22T05:42:05.287" v="49" actId="164"/>
+          <ac:picMkLst>
+            <pc:docMk/>
+            <pc:sldMk cId="155932506" sldId="257"/>
+            <ac:picMk id="12" creationId="{9FD07A5D-5130-70FE-5E09-7594D67D5681}"/>
           </ac:picMkLst>
         </pc:picChg>
       </pc:sldChg>
@@ -325,7 +394,7 @@
           <a:p>
             <a:fld id="{77B50B24-96A8-4A74-AAAC-CE8A8F80A192}" type="datetimeFigureOut">
               <a:rPr lang="en-AU" smtClean="0"/>
-              <a:t>6/09/2025</a:t>
+              <a:t>21/12/2025</a:t>
             </a:fld>
             <a:endParaRPr lang="en-AU"/>
           </a:p>
@@ -525,7 +594,7 @@
           <a:p>
             <a:fld id="{77B50B24-96A8-4A74-AAAC-CE8A8F80A192}" type="datetimeFigureOut">
               <a:rPr lang="en-AU" smtClean="0"/>
-              <a:t>6/09/2025</a:t>
+              <a:t>21/12/2025</a:t>
             </a:fld>
             <a:endParaRPr lang="en-AU"/>
           </a:p>
@@ -735,7 +804,7 @@
           <a:p>
             <a:fld id="{77B50B24-96A8-4A74-AAAC-CE8A8F80A192}" type="datetimeFigureOut">
               <a:rPr lang="en-AU" smtClean="0"/>
-              <a:t>6/09/2025</a:t>
+              <a:t>21/12/2025</a:t>
             </a:fld>
             <a:endParaRPr lang="en-AU"/>
           </a:p>
@@ -935,7 +1004,7 @@
           <a:p>
             <a:fld id="{77B50B24-96A8-4A74-AAAC-CE8A8F80A192}" type="datetimeFigureOut">
               <a:rPr lang="en-AU" smtClean="0"/>
-              <a:t>6/09/2025</a:t>
+              <a:t>21/12/2025</a:t>
             </a:fld>
             <a:endParaRPr lang="en-AU"/>
           </a:p>
@@ -1211,7 +1280,7 @@
           <a:p>
             <a:fld id="{77B50B24-96A8-4A74-AAAC-CE8A8F80A192}" type="datetimeFigureOut">
               <a:rPr lang="en-AU" smtClean="0"/>
-              <a:t>6/09/2025</a:t>
+              <a:t>21/12/2025</a:t>
             </a:fld>
             <a:endParaRPr lang="en-AU"/>
           </a:p>
@@ -1479,7 +1548,7 @@
           <a:p>
             <a:fld id="{77B50B24-96A8-4A74-AAAC-CE8A8F80A192}" type="datetimeFigureOut">
               <a:rPr lang="en-AU" smtClean="0"/>
-              <a:t>6/09/2025</a:t>
+              <a:t>21/12/2025</a:t>
             </a:fld>
             <a:endParaRPr lang="en-AU"/>
           </a:p>
@@ -1894,7 +1963,7 @@
           <a:p>
             <a:fld id="{77B50B24-96A8-4A74-AAAC-CE8A8F80A192}" type="datetimeFigureOut">
               <a:rPr lang="en-AU" smtClean="0"/>
-              <a:t>6/09/2025</a:t>
+              <a:t>21/12/2025</a:t>
             </a:fld>
             <a:endParaRPr lang="en-AU"/>
           </a:p>
@@ -2036,7 +2105,7 @@
           <a:p>
             <a:fld id="{77B50B24-96A8-4A74-AAAC-CE8A8F80A192}" type="datetimeFigureOut">
               <a:rPr lang="en-AU" smtClean="0"/>
-              <a:t>6/09/2025</a:t>
+              <a:t>21/12/2025</a:t>
             </a:fld>
             <a:endParaRPr lang="en-AU"/>
           </a:p>
@@ -2149,7 +2218,7 @@
           <a:p>
             <a:fld id="{77B50B24-96A8-4A74-AAAC-CE8A8F80A192}" type="datetimeFigureOut">
               <a:rPr lang="en-AU" smtClean="0"/>
-              <a:t>6/09/2025</a:t>
+              <a:t>21/12/2025</a:t>
             </a:fld>
             <a:endParaRPr lang="en-AU"/>
           </a:p>
@@ -2462,7 +2531,7 @@
           <a:p>
             <a:fld id="{77B50B24-96A8-4A74-AAAC-CE8A8F80A192}" type="datetimeFigureOut">
               <a:rPr lang="en-AU" smtClean="0"/>
-              <a:t>6/09/2025</a:t>
+              <a:t>21/12/2025</a:t>
             </a:fld>
             <a:endParaRPr lang="en-AU"/>
           </a:p>
@@ -2751,7 +2820,7 @@
           <a:p>
             <a:fld id="{77B50B24-96A8-4A74-AAAC-CE8A8F80A192}" type="datetimeFigureOut">
               <a:rPr lang="en-AU" smtClean="0"/>
-              <a:t>6/09/2025</a:t>
+              <a:t>21/12/2025</a:t>
             </a:fld>
             <a:endParaRPr lang="en-AU"/>
           </a:p>
@@ -2994,7 +3063,7 @@
           <a:p>
             <a:fld id="{77B50B24-96A8-4A74-AAAC-CE8A8F80A192}" type="datetimeFigureOut">
               <a:rPr lang="en-AU" smtClean="0"/>
-              <a:t>6/09/2025</a:t>
+              <a:t>21/12/2025</a:t>
             </a:fld>
             <a:endParaRPr lang="en-AU"/>
           </a:p>
@@ -3411,12 +3480,116 @@
           <a:chExt cx="0" cy="0"/>
         </a:xfrm>
       </p:grpSpPr>
+      <p:pic>
+        <p:nvPicPr>
+          <p:cNvPr id="5" name="Picture 4" descr="A couple of heads of people with different facial features&#10;&#10;AI-generated content may be incorrect.">
+            <a:extLst>
+              <a:ext uri="{FF2B5EF4-FFF2-40B4-BE49-F238E27FC236}">
+                <a16:creationId xmlns:a16="http://schemas.microsoft.com/office/drawing/2014/main" id="{4E31E2B9-2BDB-CB70-4DC7-5BEE8400F331}"/>
+              </a:ext>
+            </a:extLst>
+          </p:cNvPr>
+          <p:cNvPicPr>
+            <a:picLocks noChangeAspect="1"/>
+          </p:cNvPicPr>
+          <p:nvPr/>
+        </p:nvPicPr>
+        <p:blipFill>
+          <a:blip r:embed="rId2">
+            <a:extLst>
+              <a:ext uri="{28A0092B-C50C-407E-A947-70E740481C1C}">
+                <a14:useLocalDpi xmlns:a14="http://schemas.microsoft.com/office/drawing/2010/main" val="0"/>
+              </a:ext>
+            </a:extLst>
+          </a:blip>
+          <a:srcRect t="14363" r="50566" b="10632"/>
+          <a:stretch>
+            <a:fillRect/>
+          </a:stretch>
+        </p:blipFill>
+        <p:spPr>
+          <a:xfrm>
+            <a:off x="3399295" y="1212350"/>
+            <a:ext cx="5393409" cy="2219218"/>
+          </a:xfrm>
+          <a:prstGeom prst="rect">
+            <a:avLst/>
+          </a:prstGeom>
+        </p:spPr>
+      </p:pic>
+      <p:pic>
+        <p:nvPicPr>
+          <p:cNvPr id="6" name="Picture 5" descr="A couple of heads of people with different facial features&#10;&#10;AI-generated content may be incorrect.">
+            <a:extLst>
+              <a:ext uri="{FF2B5EF4-FFF2-40B4-BE49-F238E27FC236}">
+                <a16:creationId xmlns:a16="http://schemas.microsoft.com/office/drawing/2014/main" id="{13584306-5B7A-4D00-70D6-7A504B6CFA0A}"/>
+              </a:ext>
+            </a:extLst>
+          </p:cNvPr>
+          <p:cNvPicPr>
+            <a:picLocks noChangeAspect="1"/>
+          </p:cNvPicPr>
+          <p:nvPr/>
+        </p:nvPicPr>
+        <p:blipFill>
+          <a:blip r:embed="rId2">
+            <a:extLst>
+              <a:ext uri="{28A0092B-C50C-407E-A947-70E740481C1C}">
+                <a14:useLocalDpi xmlns:a14="http://schemas.microsoft.com/office/drawing/2010/main" val="0"/>
+              </a:ext>
+            </a:extLst>
+          </a:blip>
+          <a:srcRect l="55368" t="15718" b="9915"/>
+          <a:stretch>
+            <a:fillRect/>
+          </a:stretch>
+        </p:blipFill>
+        <p:spPr>
+          <a:xfrm>
+            <a:off x="3661250" y="3426431"/>
+            <a:ext cx="4869497" cy="2219219"/>
+          </a:xfrm>
+          <a:prstGeom prst="rect">
+            <a:avLst/>
+          </a:prstGeom>
+        </p:spPr>
+      </p:pic>
+    </p:spTree>
+    <p:extLst>
+      <p:ext uri="{BB962C8B-B14F-4D97-AF65-F5344CB8AC3E}">
+        <p14:creationId xmlns:p14="http://schemas.microsoft.com/office/powerpoint/2010/main" val="3805247489"/>
+      </p:ext>
+    </p:extLst>
+  </p:cSld>
+  <p:clrMapOvr>
+    <a:masterClrMapping/>
+  </p:clrMapOvr>
+</p:sld>
+</file>
+
+<file path=ppt/slides/slide2.xml><?xml version="1.0" encoding="utf-8"?>
+<p:sld xmlns:a="http://schemas.openxmlformats.org/drawingml/2006/main" xmlns:r="http://schemas.openxmlformats.org/officeDocument/2006/relationships" xmlns:p="http://schemas.openxmlformats.org/presentationml/2006/main">
+  <p:cSld>
+    <p:spTree>
+      <p:nvGrpSpPr>
+        <p:cNvPr id="1" name=""/>
+        <p:cNvGrpSpPr/>
+        <p:nvPr/>
+      </p:nvGrpSpPr>
+      <p:grpSpPr>
+        <a:xfrm>
+          <a:off x="0" y="0"/>
+          <a:ext cx="0" cy="0"/>
+          <a:chOff x="0" y="0"/>
+          <a:chExt cx="0" cy="0"/>
+        </a:xfrm>
+      </p:grpSpPr>
       <p:grpSp>
         <p:nvGrpSpPr>
-          <p:cNvPr id="7" name="Group 6">
-            <a:extLst>
-              <a:ext uri="{FF2B5EF4-FFF2-40B4-BE49-F238E27FC236}">
-                <a16:creationId xmlns:a16="http://schemas.microsoft.com/office/drawing/2014/main" id="{66F1C54C-61B2-4EBB-2074-56DE3E65F687}"/>
+          <p:cNvPr id="13" name="Group 12">
+            <a:extLst>
+              <a:ext uri="{FF2B5EF4-FFF2-40B4-BE49-F238E27FC236}">
+                <a16:creationId xmlns:a16="http://schemas.microsoft.com/office/drawing/2014/main" id="{78B8AAB7-C583-4D6E-A8C6-C2FD06770E74}"/>
               </a:ext>
             </a:extLst>
           </p:cNvPr>
@@ -3425,18 +3598,18 @@
         </p:nvGrpSpPr>
         <p:grpSpPr>
           <a:xfrm>
-            <a:off x="3399295" y="1212350"/>
-            <a:ext cx="5393409" cy="4433300"/>
-            <a:chOff x="514231" y="657546"/>
-            <a:chExt cx="5393409" cy="4433300"/>
+            <a:off x="3235778" y="2368607"/>
+            <a:ext cx="5720444" cy="2120786"/>
+            <a:chOff x="3367346" y="2156247"/>
+            <a:chExt cx="5720444" cy="2120786"/>
           </a:xfrm>
         </p:grpSpPr>
         <p:pic>
           <p:nvPicPr>
-            <p:cNvPr id="5" name="Picture 4" descr="A couple of heads of people with different facial features&#10;&#10;AI-generated content may be incorrect.">
+            <p:cNvPr id="9" name="Picture 8" descr="A person wearing a mask&#10;&#10;AI-generated content may be incorrect.">
               <a:extLst>
                 <a:ext uri="{FF2B5EF4-FFF2-40B4-BE49-F238E27FC236}">
-                  <a16:creationId xmlns:a16="http://schemas.microsoft.com/office/drawing/2014/main" id="{4E31E2B9-2BDB-CB70-4DC7-5BEE8400F331}"/>
+                  <a16:creationId xmlns:a16="http://schemas.microsoft.com/office/drawing/2014/main" id="{2F8D9E0B-747B-43D7-76E5-8C3E751F8F92}"/>
                 </a:ext>
               </a:extLst>
             </p:cNvPr>
@@ -3446,22 +3619,15 @@
             <p:nvPr/>
           </p:nvPicPr>
           <p:blipFill>
-            <a:blip r:embed="rId2">
-              <a:extLst>
-                <a:ext uri="{28A0092B-C50C-407E-A947-70E740481C1C}">
-                  <a14:useLocalDpi xmlns:a14="http://schemas.microsoft.com/office/drawing/2010/main" val="0"/>
-                </a:ext>
-              </a:extLst>
-            </a:blip>
-            <a:srcRect t="14363" r="50566" b="10632"/>
+            <a:blip r:embed="rId2"/>
             <a:stretch>
               <a:fillRect/>
             </a:stretch>
           </p:blipFill>
           <p:spPr>
             <a:xfrm>
-              <a:off x="514231" y="657546"/>
-              <a:ext cx="5393409" cy="2219218"/>
+              <a:off x="5288007" y="2156247"/>
+              <a:ext cx="1759801" cy="2120786"/>
             </a:xfrm>
             <a:prstGeom prst="rect">
               <a:avLst/>
@@ -3470,10 +3636,10 @@
         </p:pic>
         <p:pic>
           <p:nvPicPr>
-            <p:cNvPr id="6" name="Picture 5" descr="A couple of heads of people with different facial features&#10;&#10;AI-generated content may be incorrect.">
+            <p:cNvPr id="11" name="Picture 10" descr="A white robot with flowers on it&#10;&#10;AI-generated content may be incorrect.">
               <a:extLst>
                 <a:ext uri="{FF2B5EF4-FFF2-40B4-BE49-F238E27FC236}">
-                  <a16:creationId xmlns:a16="http://schemas.microsoft.com/office/drawing/2014/main" id="{13584306-5B7A-4D00-70D6-7A504B6CFA0A}"/>
+                  <a16:creationId xmlns:a16="http://schemas.microsoft.com/office/drawing/2014/main" id="{B10D88E1-8942-167E-256B-E4DE62A253F3}"/>
                 </a:ext>
               </a:extLst>
             </p:cNvPr>
@@ -3483,22 +3649,45 @@
             <p:nvPr/>
           </p:nvPicPr>
           <p:blipFill>
-            <a:blip r:embed="rId2">
-              <a:extLst>
-                <a:ext uri="{28A0092B-C50C-407E-A947-70E740481C1C}">
-                  <a14:useLocalDpi xmlns:a14="http://schemas.microsoft.com/office/drawing/2010/main" val="0"/>
-                </a:ext>
-              </a:extLst>
-            </a:blip>
-            <a:srcRect l="55368" t="15718" b="9915"/>
+            <a:blip r:embed="rId3"/>
             <a:stretch>
               <a:fillRect/>
             </a:stretch>
           </p:blipFill>
           <p:spPr>
             <a:xfrm>
-              <a:off x="776186" y="2871627"/>
-              <a:ext cx="4869497" cy="2219219"/>
+              <a:off x="7287265" y="2156247"/>
+              <a:ext cx="1800525" cy="2120786"/>
+            </a:xfrm>
+            <a:prstGeom prst="rect">
+              <a:avLst/>
+            </a:prstGeom>
+          </p:spPr>
+        </p:pic>
+        <p:pic>
+          <p:nvPicPr>
+            <p:cNvPr id="12" name="Picture 11" descr="A white robot with a face painted on it&#10;&#10;AI-generated content may be incorrect.">
+              <a:extLst>
+                <a:ext uri="{FF2B5EF4-FFF2-40B4-BE49-F238E27FC236}">
+                  <a16:creationId xmlns:a16="http://schemas.microsoft.com/office/drawing/2014/main" id="{9FD07A5D-5130-70FE-5E09-7594D67D5681}"/>
+                </a:ext>
+              </a:extLst>
+            </p:cNvPr>
+            <p:cNvPicPr>
+              <a:picLocks noChangeAspect="1"/>
+            </p:cNvPicPr>
+            <p:nvPr/>
+          </p:nvPicPr>
+          <p:blipFill>
+            <a:blip r:embed="rId4"/>
+            <a:stretch>
+              <a:fillRect/>
+            </a:stretch>
+          </p:blipFill>
+          <p:spPr>
+            <a:xfrm>
+              <a:off x="3367346" y="2156248"/>
+              <a:ext cx="1681204" cy="2120785"/>
             </a:xfrm>
             <a:prstGeom prst="rect">
               <a:avLst/>
@@ -3509,7 +3698,7 @@
     </p:spTree>
     <p:extLst>
       <p:ext uri="{BB962C8B-B14F-4D97-AF65-F5344CB8AC3E}">
-        <p14:creationId xmlns:p14="http://schemas.microsoft.com/office/powerpoint/2010/main" val="3805247489"/>
+        <p14:creationId xmlns:p14="http://schemas.microsoft.com/office/powerpoint/2010/main" val="155932506"/>
       </p:ext>
     </p:extLst>
   </p:cSld>

</xml_diff>